<commit_message>
include file permissions in demo & ppt
</commit_message>
<xml_diff>
--- a/kubernetes/07_configmap_secrets.pptx
+++ b/kubernetes/07_configmap_secrets.pptx
@@ -17714,6 +17714,36 @@
           <a:chExt cx="0" cy="0"/>
         </a:xfrm>
       </p:grpSpPr>
+      <p:pic>
+        <p:nvPicPr>
+          <p:cNvPr id="10" name="Picture 9">
+            <a:extLst>
+              <a:ext uri="{FF2B5EF4-FFF2-40B4-BE49-F238E27FC236}">
+                <a16:creationId xmlns:a16="http://schemas.microsoft.com/office/drawing/2014/main" id="{4298E440-AAB1-42AE-B812-6A1C59940920}"/>
+              </a:ext>
+            </a:extLst>
+          </p:cNvPr>
+          <p:cNvPicPr>
+            <a:picLocks noChangeAspect="1"/>
+          </p:cNvPicPr>
+          <p:nvPr/>
+        </p:nvPicPr>
+        <p:blipFill>
+          <a:blip r:embed="rId3"/>
+          <a:stretch>
+            <a:fillRect/>
+          </a:stretch>
+        </p:blipFill>
+        <p:spPr>
+          <a:xfrm>
+            <a:off x="504002" y="1333987"/>
+            <a:ext cx="7167334" cy="4065504"/>
+          </a:xfrm>
+          <a:prstGeom prst="rect">
+            <a:avLst/>
+          </a:prstGeom>
+        </p:spPr>
+      </p:pic>
       <p:sp>
         <p:nvSpPr>
           <p:cNvPr id="2" name="Title 1">
@@ -17742,36 +17772,6 @@
           </a:p>
         </p:txBody>
       </p:sp>
-      <p:pic>
-        <p:nvPicPr>
-          <p:cNvPr id="3" name="Picture 2">
-            <a:extLst>
-              <a:ext uri="{FF2B5EF4-FFF2-40B4-BE49-F238E27FC236}">
-                <a16:creationId xmlns:a16="http://schemas.microsoft.com/office/drawing/2014/main" id="{15188F21-E20E-4BCE-9EB8-E965780885D3}"/>
-              </a:ext>
-            </a:extLst>
-          </p:cNvPr>
-          <p:cNvPicPr>
-            <a:picLocks noChangeAspect="1"/>
-          </p:cNvPicPr>
-          <p:nvPr/>
-        </p:nvPicPr>
-        <p:blipFill>
-          <a:blip r:embed="rId3"/>
-          <a:stretch>
-            <a:fillRect/>
-          </a:stretch>
-        </p:blipFill>
-        <p:spPr>
-          <a:xfrm>
-            <a:off x="504001" y="1180605"/>
-            <a:ext cx="7167334" cy="4058825"/>
-          </a:xfrm>
-          <a:prstGeom prst="rect">
-            <a:avLst/>
-          </a:prstGeom>
-        </p:spPr>
-      </p:pic>
       <p:pic>
         <p:nvPicPr>
           <p:cNvPr id="4" name="Picture 3">
@@ -17816,13 +17816,13 @@
         </p:nvSpPr>
         <p:spPr bwMode="gray">
           <a:xfrm>
-            <a:off x="8120808" y="3975675"/>
+            <a:off x="8120807" y="2426008"/>
             <a:ext cx="2707609" cy="1127848"/>
           </a:xfrm>
           <a:prstGeom prst="wedgeRectCallout">
             <a:avLst>
-              <a:gd name="adj1" fmla="val -160246"/>
-              <a:gd name="adj2" fmla="val 26381"/>
+              <a:gd name="adj1" fmla="val -159891"/>
+              <a:gd name="adj2" fmla="val 34915"/>
             </a:avLst>
           </a:prstGeom>
           <a:ln>
@@ -17869,7 +17869,7 @@
                 <a:ea typeface="Arial Unicode MS" pitchFamily="34" charset="-128"/>
                 <a:cs typeface="Arial Unicode MS" pitchFamily="34" charset="-128"/>
               </a:rPr>
-              <a:t>Mount the secret read-only to a directory</a:t>
+              <a:t>Specify default access permissions</a:t>
             </a:r>
             <a:endParaRPr kumimoji="0" lang="en-US" sz="1800" b="0" i="0" u="none" strike="noStrike" kern="0" cap="none" spc="0" normalizeH="0" baseline="0" noProof="0" dirty="0">
               <a:ln>
@@ -17980,13 +17980,13 @@
         </p:nvSpPr>
         <p:spPr bwMode="gray">
           <a:xfrm>
-            <a:off x="8120808" y="2457210"/>
+            <a:off x="8120808" y="4006877"/>
             <a:ext cx="2707609" cy="1127848"/>
           </a:xfrm>
           <a:prstGeom prst="wedgeRectCallout">
             <a:avLst>
-              <a:gd name="adj1" fmla="val -77417"/>
-              <a:gd name="adj2" fmla="val 72466"/>
+              <a:gd name="adj1" fmla="val -67463"/>
+              <a:gd name="adj2" fmla="val 5899"/>
             </a:avLst>
           </a:prstGeom>
           <a:ln>

</xml_diff>

<commit_message>
fix tipos and ref. to demo in slide notes
</commit_message>
<xml_diff>
--- a/kubernetes/07_configmap_secrets.pptx
+++ b/kubernetes/07_configmap_secrets.pptx
@@ -991,7 +991,31 @@
             </a:r>
             <a:r>
               <a:rPr lang="en-US" dirty="0"/>
-              <a:t> is created it’s content can be projected into pods as an environment variable or mounted as a file.</a:t>
+              <a:t> is created it’s content can be </a:t>
+            </a:r>
+            <a:r>
+              <a:rPr lang="en-US" b="1" dirty="0"/>
+              <a:t>projected into pods</a:t>
+            </a:r>
+            <a:r>
+              <a:rPr lang="en-US" dirty="0"/>
+              <a:t> as an </a:t>
+            </a:r>
+            <a:r>
+              <a:rPr lang="en-US" b="1" dirty="0"/>
+              <a:t>environment variable</a:t>
+            </a:r>
+            <a:r>
+              <a:rPr lang="en-US" dirty="0"/>
+              <a:t> or </a:t>
+            </a:r>
+            <a:r>
+              <a:rPr lang="en-US" b="1" dirty="0"/>
+              <a:t>mounted as a file</a:t>
+            </a:r>
+            <a:r>
+              <a:rPr lang="en-US" dirty="0"/>
+              <a:t>.</a:t>
             </a:r>
           </a:p>
         </p:txBody>
@@ -1162,7 +1186,7 @@
             </a:r>
             <a:r>
               <a:rPr lang="en-US" dirty="0"/>
-              <a:t> get pods –a” to display also terminated/completed pods. Use “</a:t>
+              <a:t> get pods -a” to display also terminated/completed pods. Use “</a:t>
             </a:r>
             <a:r>
               <a:rPr lang="en-US" dirty="0" err="1"/>
@@ -1320,16 +1344,28 @@
               <a:buChar char="-"/>
             </a:pPr>
             <a:r>
+              <a:rPr lang="en-US" b="1" dirty="0"/>
+              <a:t>generic</a:t>
+            </a:r>
+            <a:r>
               <a:rPr lang="en-US" dirty="0"/>
-              <a:t>generic: to store credentials like passwords. Include as </a:t>
-            </a:r>
-            <a:r>
-              <a:rPr lang="en-US" dirty="0" err="1"/>
+              <a:t>: to store credentials like passwords. Include as </a:t>
+            </a:r>
+            <a:r>
+              <a:rPr lang="en-US" b="1" dirty="0" err="1"/>
               <a:t>env</a:t>
             </a:r>
             <a:r>
+              <a:rPr lang="en-US" b="1" dirty="0"/>
+              <a:t> variables</a:t>
+            </a:r>
+            <a:r>
               <a:rPr lang="en-US" dirty="0"/>
-              <a:t> variables or mount files</a:t>
+              <a:t> or </a:t>
+            </a:r>
+            <a:r>
+              <a:rPr lang="en-US" b="1" dirty="0"/>
+              <a:t>mount files</a:t>
             </a:r>
           </a:p>
           <a:p>
@@ -1348,16 +1384,28 @@
               <a:buChar char="-"/>
             </a:pPr>
             <a:r>
+              <a:rPr lang="en-US" b="1" dirty="0"/>
+              <a:t>Docker-registry</a:t>
+            </a:r>
+            <a:r>
               <a:rPr lang="en-US" dirty="0"/>
-              <a:t>Docker-registry: Contains credentials to authenticate pulls from protected registry like the docker store or a private registry. Assign the secret as “</a:t>
-            </a:r>
-            <a:r>
-              <a:rPr lang="en-US" dirty="0" err="1"/>
+              <a:t>: Contains credentials to authenticate pulls from protected registry like the docker store or a private registry. Assign the secret as </a:t>
+            </a:r>
+            <a:r>
+              <a:rPr lang="en-US" b="1" dirty="0"/>
+              <a:t>“</a:t>
+            </a:r>
+            <a:r>
+              <a:rPr lang="en-US" b="1" dirty="0" err="1"/>
               <a:t>imagePullSecret</a:t>
             </a:r>
             <a:r>
+              <a:rPr lang="en-US" b="1" dirty="0"/>
+              <a:t>” </a:t>
+            </a:r>
+            <a:r>
               <a:rPr lang="en-US" dirty="0"/>
-              <a:t>” to a pod, to use the credentials for image pulling for this pod. </a:t>
+              <a:t>to a pod, to use the credentials for image pulling for this pod. </a:t>
             </a:r>
           </a:p>
         </p:txBody>
@@ -1461,13 +1509,13 @@
             </a:r>
             <a:r>
               <a:rPr lang="en-US" dirty="0"/>
-              <a:t> and pipe it into base64 –d.</a:t>
+              <a:t> and pipe it into base64 -d.</a:t>
             </a:r>
           </a:p>
           <a:p>
             <a:r>
               <a:rPr lang="en-US" dirty="0"/>
-              <a:t>Example: echo U2VjcmV0NGV2ZXIK | base64 –d</a:t>
+              <a:t>Example: echo U2VjcmV0NGV2ZXIK | base64 -d</a:t>
             </a:r>
           </a:p>
           <a:p>
@@ -1479,8 +1527,16 @@
               <a:t>To rebuild the demo use the </a:t>
             </a:r>
             <a:r>
-              <a:rPr lang="en-US" dirty="0" err="1"/>
-              <a:t>secret_pod_demo.yaml</a:t>
+              <a:rPr lang="en-US" b="1" dirty="0"/>
+              <a:t>07d_demo_pod_with_secret.yaml</a:t>
+            </a:r>
+            <a:r>
+              <a:rPr lang="en-US" dirty="0"/>
+              <a:t> and </a:t>
+            </a:r>
+            <a:r>
+              <a:rPr lang="en-US" b="1" dirty="0"/>
+              <a:t>07c_demo_secret.yaml</a:t>
             </a:r>
             <a:r>
               <a:rPr lang="en-US" dirty="0"/>
@@ -1492,7 +1548,7 @@
             </a:r>
             <a:r>
               <a:rPr lang="en-US" dirty="0"/>
-              <a:t>/solutions. It contains the secret &amp; a pod mounting the secret.</a:t>
+              <a:t>/demo. It contains the secret &amp; a pod mounting the secret.</a:t>
             </a:r>
           </a:p>
         </p:txBody>
@@ -1822,8 +1878,21 @@
             </a:r>
             <a:r>
               <a:rPr lang="en-US" baseline="0" dirty="0"/>
-              <a:t> format and send the value for password to base64 –decode:  echo U2VjcmV0NGV2ZXIK | base64 –d</a:t>
-            </a:r>
+              <a:t> format and send the value for password to </a:t>
+            </a:r>
+            <a:r>
+              <a:rPr lang="en-US" baseline="0"/>
+              <a:t>base64 -decode</a:t>
+            </a:r>
+            <a:r>
+              <a:rPr lang="en-US" baseline="0" dirty="0"/>
+              <a:t>:  echo U2VjcmV0NGV2ZXIK | </a:t>
+            </a:r>
+            <a:r>
+              <a:rPr lang="en-US" baseline="0"/>
+              <a:t>base64 -d</a:t>
+            </a:r>
+            <a:endParaRPr lang="en-US" baseline="0" dirty="0"/>
           </a:p>
           <a:p>
             <a:pPr marL="285750" marR="0" lvl="0" indent="-285750" algn="l" defTabSz="1088776" rtl="0" eaLnBrk="1" fontAlgn="auto" latinLnBrk="0" hangingPunct="1">
@@ -1868,13 +1937,8 @@
             </a:pPr>
             <a:r>
               <a:rPr lang="en-US" baseline="0" dirty="0"/>
-              <a:t>=&gt; highlight that the values are accessible in clear text within the </a:t>
-            </a:r>
-            <a:r>
-              <a:rPr lang="en-US" baseline="0"/>
-              <a:t>pod context</a:t>
-            </a:r>
-            <a:endParaRPr lang="en-US" baseline="0" dirty="0"/>
+              <a:t>=&gt; highlight that the values are accessible in clear text within the pod context</a:t>
+            </a:r>
           </a:p>
         </p:txBody>
       </p:sp>

</xml_diff>

<commit_message>
fix link to configmap docu
</commit_message>
<xml_diff>
--- a/kubernetes/07_configmap_secrets.pptx
+++ b/kubernetes/07_configmap_secrets.pptx
@@ -17636,7 +17636,7 @@
         <p:spPr>
           <a:xfrm>
             <a:off x="504000" y="1223190"/>
-            <a:ext cx="10590719" cy="1384995"/>
+            <a:ext cx="11106753" cy="1384995"/>
           </a:xfrm>
           <a:prstGeom prst="rect">
             <a:avLst/>
@@ -17689,11 +17689,11 @@
               <a:rPr lang="en-US" dirty="0">
                 <a:hlinkClick r:id="rId4"/>
               </a:rPr>
-              <a:t>https://kubernetes.io/docs/tasks/configure-pod-container/configmap/</a:t>
+              <a:t>https://kubernetes.io/docs/tasks/configure-pod-container/configure-pod-configmap/</a:t>
             </a:r>
             <a:r>
               <a:rPr lang="en-US" dirty="0"/>
-              <a:t>  </a:t>
+              <a:t> </a:t>
             </a:r>
           </a:p>
         </p:txBody>

</xml_diff>